<commit_message>
new questions and API arrow
</commit_message>
<xml_diff>
--- a/HBTechTalk.pptx
+++ b/HBTechTalk.pptx
@@ -125,7 +125,7 @@
   </p:defaultTextStyle>
   <p:extLst>
     <p:ext uri="{EFAFB233-063F-42B5-8137-9DF3F51BA10A}">
-      <p15:sldGuideLst xmlns:p15="http://schemas.microsoft.com/office/powerpoint/2012/main">
+      <p15:sldGuideLst xmlns:p15="http://schemas.microsoft.com/office/powerpoint/2012/main" xmlns="">
         <p15:guide id="1" orient="horz" pos="2160">
           <p15:clr>
             <a:srgbClr val="A4A3A4"/>
@@ -228,7 +228,7 @@
           <a:p>
             <a:fld id="{0FE74745-D45D-B94B-BB42-FF3F59C5ACF8}" type="datetimeFigureOut">
               <a:rPr lang="en-US" smtClean="0"/>
-              <a:t>1/11/2018</a:t>
+              <a:t>1/14/18</a:t>
             </a:fld>
             <a:endParaRPr lang="en-US"/>
           </a:p>
@@ -2255,7 +2255,7 @@
           <a:p>
             <a:fld id="{0FF60B50-4652-3C48-A27A-EE3A74F260CA}" type="datetimeFigureOut">
               <a:rPr lang="en-US" smtClean="0"/>
-              <a:t>1/11/2018</a:t>
+              <a:t>1/14/18</a:t>
             </a:fld>
             <a:endParaRPr lang="en-US"/>
           </a:p>
@@ -2423,7 +2423,7 @@
           <a:p>
             <a:fld id="{0FF60B50-4652-3C48-A27A-EE3A74F260CA}" type="datetimeFigureOut">
               <a:rPr lang="en-US" smtClean="0"/>
-              <a:t>1/11/2018</a:t>
+              <a:t>1/14/18</a:t>
             </a:fld>
             <a:endParaRPr lang="en-US"/>
           </a:p>
@@ -2601,7 +2601,7 @@
           <a:p>
             <a:fld id="{0FF60B50-4652-3C48-A27A-EE3A74F260CA}" type="datetimeFigureOut">
               <a:rPr lang="en-US" smtClean="0"/>
-              <a:t>1/11/2018</a:t>
+              <a:t>1/14/18</a:t>
             </a:fld>
             <a:endParaRPr lang="en-US"/>
           </a:p>
@@ -2769,7 +2769,7 @@
           <a:p>
             <a:fld id="{0FF60B50-4652-3C48-A27A-EE3A74F260CA}" type="datetimeFigureOut">
               <a:rPr lang="en-US" smtClean="0"/>
-              <a:t>1/11/2018</a:t>
+              <a:t>1/14/18</a:t>
             </a:fld>
             <a:endParaRPr lang="en-US"/>
           </a:p>
@@ -3014,7 +3014,7 @@
           <a:p>
             <a:fld id="{0FF60B50-4652-3C48-A27A-EE3A74F260CA}" type="datetimeFigureOut">
               <a:rPr lang="en-US" smtClean="0"/>
-              <a:t>1/11/2018</a:t>
+              <a:t>1/14/18</a:t>
             </a:fld>
             <a:endParaRPr lang="en-US"/>
           </a:p>
@@ -3299,7 +3299,7 @@
           <a:p>
             <a:fld id="{0FF60B50-4652-3C48-A27A-EE3A74F260CA}" type="datetimeFigureOut">
               <a:rPr lang="en-US" smtClean="0"/>
-              <a:t>1/11/2018</a:t>
+              <a:t>1/14/18</a:t>
             </a:fld>
             <a:endParaRPr lang="en-US"/>
           </a:p>
@@ -3718,7 +3718,7 @@
           <a:p>
             <a:fld id="{0FF60B50-4652-3C48-A27A-EE3A74F260CA}" type="datetimeFigureOut">
               <a:rPr lang="en-US" smtClean="0"/>
-              <a:t>1/11/2018</a:t>
+              <a:t>1/14/18</a:t>
             </a:fld>
             <a:endParaRPr lang="en-US"/>
           </a:p>
@@ -3835,7 +3835,7 @@
           <a:p>
             <a:fld id="{0FF60B50-4652-3C48-A27A-EE3A74F260CA}" type="datetimeFigureOut">
               <a:rPr lang="en-US" smtClean="0"/>
-              <a:t>1/11/2018</a:t>
+              <a:t>1/14/18</a:t>
             </a:fld>
             <a:endParaRPr lang="en-US"/>
           </a:p>
@@ -3930,7 +3930,7 @@
           <a:p>
             <a:fld id="{0FF60B50-4652-3C48-A27A-EE3A74F260CA}" type="datetimeFigureOut">
               <a:rPr lang="en-US" smtClean="0"/>
-              <a:t>1/11/2018</a:t>
+              <a:t>1/14/18</a:t>
             </a:fld>
             <a:endParaRPr lang="en-US"/>
           </a:p>
@@ -4205,7 +4205,7 @@
           <a:p>
             <a:fld id="{0FF60B50-4652-3C48-A27A-EE3A74F260CA}" type="datetimeFigureOut">
               <a:rPr lang="en-US" smtClean="0"/>
-              <a:t>1/11/2018</a:t>
+              <a:t>1/14/18</a:t>
             </a:fld>
             <a:endParaRPr lang="en-US"/>
           </a:p>
@@ -4457,7 +4457,7 @@
           <a:p>
             <a:fld id="{0FF60B50-4652-3C48-A27A-EE3A74F260CA}" type="datetimeFigureOut">
               <a:rPr lang="en-US" smtClean="0"/>
-              <a:t>1/11/2018</a:t>
+              <a:t>1/14/18</a:t>
             </a:fld>
             <a:endParaRPr lang="en-US"/>
           </a:p>
@@ -4668,7 +4668,7 @@
           <a:p>
             <a:fld id="{0FF60B50-4652-3C48-A27A-EE3A74F260CA}" type="datetimeFigureOut">
               <a:rPr lang="en-US" smtClean="0"/>
-              <a:t>1/11/2018</a:t>
+              <a:t>1/14/18</a:t>
             </a:fld>
             <a:endParaRPr lang="en-US"/>
           </a:p>
@@ -5157,6 +5157,13 @@
   <p:clrMapOvr>
     <a:masterClrMapping/>
   </p:clrMapOvr>
+  <p:timing>
+    <p:tnLst>
+      <p:par>
+        <p:cTn xmlns:p14="http://schemas.microsoft.com/office/powerpoint/2010/main" id="1" dur="indefinite" restart="never" nodeType="tmRoot"/>
+      </p:par>
+    </p:tnLst>
+  </p:timing>
 </p:sld>
 </file>
 
@@ -5235,35 +5242,35 @@
                 <a:gridCol w="1219200">
                   <a:extLst>
                     <a:ext uri="{9D8B030D-6E8A-4147-A177-3AD203B41FA5}">
-                      <a16:colId xmlns:a16="http://schemas.microsoft.com/office/drawing/2014/main" val="20000"/>
+                      <a16:colId xmlns:a16="http://schemas.microsoft.com/office/drawing/2014/main" xmlns="" val="20000"/>
                     </a:ext>
                   </a:extLst>
                 </a:gridCol>
                 <a:gridCol w="1219200">
                   <a:extLst>
                     <a:ext uri="{9D8B030D-6E8A-4147-A177-3AD203B41FA5}">
-                      <a16:colId xmlns:a16="http://schemas.microsoft.com/office/drawing/2014/main" val="20001"/>
+                      <a16:colId xmlns:a16="http://schemas.microsoft.com/office/drawing/2014/main" xmlns="" val="20001"/>
                     </a:ext>
                   </a:extLst>
                 </a:gridCol>
                 <a:gridCol w="1219200">
                   <a:extLst>
                     <a:ext uri="{9D8B030D-6E8A-4147-A177-3AD203B41FA5}">
-                      <a16:colId xmlns:a16="http://schemas.microsoft.com/office/drawing/2014/main" val="20002"/>
+                      <a16:colId xmlns:a16="http://schemas.microsoft.com/office/drawing/2014/main" xmlns="" val="20002"/>
                     </a:ext>
                   </a:extLst>
                 </a:gridCol>
                 <a:gridCol w="1219200">
                   <a:extLst>
                     <a:ext uri="{9D8B030D-6E8A-4147-A177-3AD203B41FA5}">
-                      <a16:colId xmlns:a16="http://schemas.microsoft.com/office/drawing/2014/main" val="20003"/>
+                      <a16:colId xmlns:a16="http://schemas.microsoft.com/office/drawing/2014/main" xmlns="" val="20003"/>
                     </a:ext>
                   </a:extLst>
                 </a:gridCol>
                 <a:gridCol w="1219200">
                   <a:extLst>
                     <a:ext uri="{9D8B030D-6E8A-4147-A177-3AD203B41FA5}">
-                      <a16:colId xmlns:a16="http://schemas.microsoft.com/office/drawing/2014/main" val="20004"/>
+                      <a16:colId xmlns:a16="http://schemas.microsoft.com/office/drawing/2014/main" xmlns="" val="20004"/>
                     </a:ext>
                   </a:extLst>
                 </a:gridCol>
@@ -5344,7 +5351,7 @@
                 </a:tc>
                 <a:extLst>
                   <a:ext uri="{0D108BD9-81ED-4DB2-BD59-A6C34878D82A}">
-                    <a16:rowId xmlns:a16="http://schemas.microsoft.com/office/drawing/2014/main" val="10000"/>
+                    <a16:rowId xmlns:a16="http://schemas.microsoft.com/office/drawing/2014/main" xmlns="" val="10000"/>
                   </a:ext>
                 </a:extLst>
               </a:tr>
@@ -5401,7 +5408,7 @@
                 </a:tc>
                 <a:extLst>
                   <a:ext uri="{0D108BD9-81ED-4DB2-BD59-A6C34878D82A}">
-                    <a16:rowId xmlns:a16="http://schemas.microsoft.com/office/drawing/2014/main" val="10001"/>
+                    <a16:rowId xmlns:a16="http://schemas.microsoft.com/office/drawing/2014/main" xmlns="" val="10001"/>
                   </a:ext>
                 </a:extLst>
               </a:tr>
@@ -5437,28 +5444,28 @@
                 <a:gridCol w="1524000">
                   <a:extLst>
                     <a:ext uri="{9D8B030D-6E8A-4147-A177-3AD203B41FA5}">
-                      <a16:colId xmlns:a16="http://schemas.microsoft.com/office/drawing/2014/main" val="20000"/>
+                      <a16:colId xmlns:a16="http://schemas.microsoft.com/office/drawing/2014/main" xmlns="" val="20000"/>
                     </a:ext>
                   </a:extLst>
                 </a:gridCol>
                 <a:gridCol w="1524000">
                   <a:extLst>
                     <a:ext uri="{9D8B030D-6E8A-4147-A177-3AD203B41FA5}">
-                      <a16:colId xmlns:a16="http://schemas.microsoft.com/office/drawing/2014/main" val="20001"/>
+                      <a16:colId xmlns:a16="http://schemas.microsoft.com/office/drawing/2014/main" xmlns="" val="20001"/>
                     </a:ext>
                   </a:extLst>
                 </a:gridCol>
                 <a:gridCol w="1524000">
                   <a:extLst>
                     <a:ext uri="{9D8B030D-6E8A-4147-A177-3AD203B41FA5}">
-                      <a16:colId xmlns:a16="http://schemas.microsoft.com/office/drawing/2014/main" val="20002"/>
+                      <a16:colId xmlns:a16="http://schemas.microsoft.com/office/drawing/2014/main" xmlns="" val="20002"/>
                     </a:ext>
                   </a:extLst>
                 </a:gridCol>
                 <a:gridCol w="1524000">
                   <a:extLst>
                     <a:ext uri="{9D8B030D-6E8A-4147-A177-3AD203B41FA5}">
-                      <a16:colId xmlns:a16="http://schemas.microsoft.com/office/drawing/2014/main" val="20003"/>
+                      <a16:colId xmlns:a16="http://schemas.microsoft.com/office/drawing/2014/main" xmlns="" val="20003"/>
                     </a:ext>
                   </a:extLst>
                 </a:gridCol>
@@ -5525,7 +5532,7 @@
                 </a:tc>
                 <a:extLst>
                   <a:ext uri="{0D108BD9-81ED-4DB2-BD59-A6C34878D82A}">
-                    <a16:rowId xmlns:a16="http://schemas.microsoft.com/office/drawing/2014/main" val="10000"/>
+                    <a16:rowId xmlns:a16="http://schemas.microsoft.com/office/drawing/2014/main" xmlns="" val="10000"/>
                   </a:ext>
                 </a:extLst>
               </a:tr>
@@ -5576,7 +5583,7 @@
                 </a:tc>
                 <a:extLst>
                   <a:ext uri="{0D108BD9-81ED-4DB2-BD59-A6C34878D82A}">
-                    <a16:rowId xmlns:a16="http://schemas.microsoft.com/office/drawing/2014/main" val="10001"/>
+                    <a16:rowId xmlns:a16="http://schemas.microsoft.com/office/drawing/2014/main" xmlns="" val="10001"/>
                   </a:ext>
                 </a:extLst>
               </a:tr>
@@ -5612,28 +5619,28 @@
                 <a:gridCol w="1524000">
                   <a:extLst>
                     <a:ext uri="{9D8B030D-6E8A-4147-A177-3AD203B41FA5}">
-                      <a16:colId xmlns:a16="http://schemas.microsoft.com/office/drawing/2014/main" val="20000"/>
+                      <a16:colId xmlns:a16="http://schemas.microsoft.com/office/drawing/2014/main" xmlns="" val="20000"/>
                     </a:ext>
                   </a:extLst>
                 </a:gridCol>
                 <a:gridCol w="1524000">
                   <a:extLst>
                     <a:ext uri="{9D8B030D-6E8A-4147-A177-3AD203B41FA5}">
-                      <a16:colId xmlns:a16="http://schemas.microsoft.com/office/drawing/2014/main" val="20001"/>
+                      <a16:colId xmlns:a16="http://schemas.microsoft.com/office/drawing/2014/main" xmlns="" val="20001"/>
                     </a:ext>
                   </a:extLst>
                 </a:gridCol>
                 <a:gridCol w="1524000">
                   <a:extLst>
                     <a:ext uri="{9D8B030D-6E8A-4147-A177-3AD203B41FA5}">
-                      <a16:colId xmlns:a16="http://schemas.microsoft.com/office/drawing/2014/main" val="20002"/>
+                      <a16:colId xmlns:a16="http://schemas.microsoft.com/office/drawing/2014/main" xmlns="" val="20002"/>
                     </a:ext>
                   </a:extLst>
                 </a:gridCol>
                 <a:gridCol w="1524000">
                   <a:extLst>
                     <a:ext uri="{9D8B030D-6E8A-4147-A177-3AD203B41FA5}">
-                      <a16:colId xmlns:a16="http://schemas.microsoft.com/office/drawing/2014/main" val="20003"/>
+                      <a16:colId xmlns:a16="http://schemas.microsoft.com/office/drawing/2014/main" xmlns="" val="20003"/>
                     </a:ext>
                   </a:extLst>
                 </a:gridCol>
@@ -5700,7 +5707,7 @@
                 </a:tc>
                 <a:extLst>
                   <a:ext uri="{0D108BD9-81ED-4DB2-BD59-A6C34878D82A}">
-                    <a16:rowId xmlns:a16="http://schemas.microsoft.com/office/drawing/2014/main" val="10000"/>
+                    <a16:rowId xmlns:a16="http://schemas.microsoft.com/office/drawing/2014/main" xmlns="" val="10000"/>
                   </a:ext>
                 </a:extLst>
               </a:tr>
@@ -5747,7 +5754,7 @@
                 </a:tc>
                 <a:extLst>
                   <a:ext uri="{0D108BD9-81ED-4DB2-BD59-A6C34878D82A}">
-                    <a16:rowId xmlns:a16="http://schemas.microsoft.com/office/drawing/2014/main" val="10001"/>
+                    <a16:rowId xmlns:a16="http://schemas.microsoft.com/office/drawing/2014/main" xmlns="" val="10001"/>
                   </a:ext>
                 </a:extLst>
               </a:tr>
@@ -5783,21 +5790,21 @@
                 <a:gridCol w="2032000">
                   <a:extLst>
                     <a:ext uri="{9D8B030D-6E8A-4147-A177-3AD203B41FA5}">
-                      <a16:colId xmlns:a16="http://schemas.microsoft.com/office/drawing/2014/main" val="20000"/>
+                      <a16:colId xmlns:a16="http://schemas.microsoft.com/office/drawing/2014/main" xmlns="" val="20000"/>
                     </a:ext>
                   </a:extLst>
                 </a:gridCol>
                 <a:gridCol w="2032000">
                   <a:extLst>
                     <a:ext uri="{9D8B030D-6E8A-4147-A177-3AD203B41FA5}">
-                      <a16:colId xmlns:a16="http://schemas.microsoft.com/office/drawing/2014/main" val="20001"/>
+                      <a16:colId xmlns:a16="http://schemas.microsoft.com/office/drawing/2014/main" xmlns="" val="20001"/>
                     </a:ext>
                   </a:extLst>
                 </a:gridCol>
                 <a:gridCol w="2032000">
                   <a:extLst>
                     <a:ext uri="{9D8B030D-6E8A-4147-A177-3AD203B41FA5}">
-                      <a16:colId xmlns:a16="http://schemas.microsoft.com/office/drawing/2014/main" val="20002"/>
+                      <a16:colId xmlns:a16="http://schemas.microsoft.com/office/drawing/2014/main" xmlns="" val="20002"/>
                     </a:ext>
                   </a:extLst>
                 </a:gridCol>
@@ -5849,7 +5856,7 @@
                 </a:tc>
                 <a:extLst>
                   <a:ext uri="{0D108BD9-81ED-4DB2-BD59-A6C34878D82A}">
-                    <a16:rowId xmlns:a16="http://schemas.microsoft.com/office/drawing/2014/main" val="10000"/>
+                    <a16:rowId xmlns:a16="http://schemas.microsoft.com/office/drawing/2014/main" xmlns="" val="10000"/>
                   </a:ext>
                 </a:extLst>
               </a:tr>
@@ -5886,7 +5893,7 @@
                 </a:tc>
                 <a:extLst>
                   <a:ext uri="{0D108BD9-81ED-4DB2-BD59-A6C34878D82A}">
-                    <a16:rowId xmlns:a16="http://schemas.microsoft.com/office/drawing/2014/main" val="10001"/>
+                    <a16:rowId xmlns:a16="http://schemas.microsoft.com/office/drawing/2014/main" xmlns="" val="10001"/>
                   </a:ext>
                 </a:extLst>
               </a:tr>
@@ -5907,7 +5914,7 @@
   <p:timing>
     <p:tnLst>
       <p:par>
-        <p:cTn id="1" dur="indefinite" restart="never" nodeType="tmRoot">
+        <p:cTn xmlns:p14="http://schemas.microsoft.com/office/powerpoint/2010/main" id="1" dur="indefinite" restart="never" nodeType="tmRoot">
           <p:childTnLst>
             <p:seq concurrent="1" nextAc="seek">
               <p:cTn id="2" dur="indefinite" nodeType="mainSeq">
@@ -6266,6 +6273,13 @@
   <p:clrMapOvr>
     <a:masterClrMapping/>
   </p:clrMapOvr>
+  <p:timing>
+    <p:tnLst>
+      <p:par>
+        <p:cTn xmlns:p14="http://schemas.microsoft.com/office/powerpoint/2010/main" id="1" dur="indefinite" restart="never" nodeType="tmRoot"/>
+      </p:par>
+    </p:tnLst>
+  </p:timing>
 </p:sld>
 </file>
 
@@ -6486,7 +6500,7 @@
   <p:timing>
     <p:tnLst>
       <p:par>
-        <p:cTn id="1" dur="indefinite" restart="never" nodeType="tmRoot">
+        <p:cTn xmlns:p14="http://schemas.microsoft.com/office/powerpoint/2010/main" id="1" dur="indefinite" restart="never" nodeType="tmRoot">
           <p:childTnLst>
             <p:seq concurrent="1" nextAc="seek">
               <p:cTn id="2" dur="indefinite" nodeType="mainSeq">
@@ -6807,7 +6821,7 @@
         </p:blipFill>
         <p:spPr>
           <a:xfrm>
-            <a:off x="229509" y="1765990"/>
+            <a:off x="318939" y="2588838"/>
             <a:ext cx="1331149" cy="1331149"/>
           </a:xfrm>
           <a:prstGeom prst="rect">
@@ -6823,8 +6837,8 @@
         </p:nvSpPr>
         <p:spPr>
           <a:xfrm>
-            <a:off x="457200" y="3043535"/>
-            <a:ext cx="918034" cy="369332"/>
+            <a:off x="546630" y="3866383"/>
+            <a:ext cx="918034" cy="477054"/>
           </a:xfrm>
           <a:prstGeom prst="rect">
             <a:avLst/>
@@ -6839,9 +6853,47 @@
           <a:p>
             <a:pPr algn="ctr"/>
             <a:r>
-              <a:rPr lang="en-US" dirty="0"/>
+              <a:rPr lang="en-US" sz="2500" dirty="0"/>
               <a:t>API</a:t>
             </a:r>
+          </a:p>
+        </p:txBody>
+      </p:sp>
+      <p:sp>
+        <p:nvSpPr>
+          <p:cNvPr id="3" name="Right Arrow 2"/>
+          <p:cNvSpPr/>
+          <p:nvPr/>
+        </p:nvSpPr>
+        <p:spPr>
+          <a:xfrm rot="19608351">
+            <a:off x="1699129" y="2987372"/>
+            <a:ext cx="733308" cy="268327"/>
+          </a:xfrm>
+          <a:prstGeom prst="rightArrow">
+            <a:avLst/>
+          </a:prstGeom>
+        </p:spPr>
+        <p:style>
+          <a:lnRef idx="1">
+            <a:schemeClr val="accent1"/>
+          </a:lnRef>
+          <a:fillRef idx="2">
+            <a:schemeClr val="accent1"/>
+          </a:fillRef>
+          <a:effectRef idx="1">
+            <a:schemeClr val="accent1"/>
+          </a:effectRef>
+          <a:fontRef idx="minor">
+            <a:schemeClr val="dk1"/>
+          </a:fontRef>
+        </p:style>
+        <p:txBody>
+          <a:bodyPr rtlCol="0" anchor="ctr"/>
+          <a:lstStyle/>
+          <a:p>
+            <a:pPr algn="ctr"/>
+            <a:endParaRPr lang="en-US"/>
           </a:p>
         </p:txBody>
       </p:sp>
@@ -6858,7 +6910,7 @@
   <p:timing>
     <p:tnLst>
       <p:par>
-        <p:cTn id="1" dur="indefinite" restart="never" nodeType="tmRoot">
+        <p:cTn xmlns:p14="http://schemas.microsoft.com/office/powerpoint/2010/main" id="1" dur="indefinite" restart="never" nodeType="tmRoot">
           <p:childTnLst>
             <p:seq concurrent="1" nextAc="seek">
               <p:cTn id="2" dur="indefinite" nodeType="mainSeq">
@@ -7023,6 +7075,13 @@
   <p:clrMapOvr>
     <a:masterClrMapping/>
   </p:clrMapOvr>
+  <p:timing>
+    <p:tnLst>
+      <p:par>
+        <p:cTn xmlns:p14="http://schemas.microsoft.com/office/powerpoint/2010/main" id="1" dur="indefinite" restart="never" nodeType="tmRoot"/>
+      </p:par>
+    </p:tnLst>
+  </p:timing>
 </p:sld>
 </file>
 
@@ -7087,31 +7146,39 @@
           <a:p>
             <a:r>
               <a:rPr lang="en-US" dirty="0"/>
-              <a:t>What season do people buy umbrellas?</a:t>
-            </a:r>
-          </a:p>
-          <a:p>
+              <a:t>What else do </a:t>
+            </a:r>
+            <a:r>
+              <a:rPr lang="en-US" dirty="0" smtClean="0"/>
+              <a:t>people buy, along with umbrellas </a:t>
+            </a:r>
             <a:r>
               <a:rPr lang="en-US" dirty="0"/>
-              <a:t>How long do people wait after first rain to buy umbrellas?  </a:t>
-            </a:r>
+              <a:t>in same season? </a:t>
+            </a:r>
+            <a:endParaRPr lang="en-US" dirty="0" smtClean="0"/>
+          </a:p>
+          <a:p>
+            <a:endParaRPr lang="en-US" dirty="0" smtClean="0"/>
+          </a:p>
+          <a:p>
+            <a:r>
+              <a:rPr lang="en-US" dirty="0" smtClean="0"/>
+              <a:t>How </a:t>
+            </a:r>
+            <a:r>
+              <a:rPr lang="en-US" dirty="0"/>
+              <a:t>long do people wait after first rain to buy umbrellas?  </a:t>
+            </a:r>
+            <a:endParaRPr lang="en-US" dirty="0" smtClean="0"/>
+          </a:p>
+          <a:p>
+            <a:endParaRPr lang="en-US" dirty="0"/>
           </a:p>
           <a:p>
             <a:r>
               <a:rPr lang="en-US" dirty="0"/>
               <a:t>How long do people wait before peak rainfall to buy umbrellas? </a:t>
-            </a:r>
-          </a:p>
-          <a:p>
-            <a:r>
-              <a:rPr lang="en-US" dirty="0"/>
-              <a:t>What else do same people buy in same season? </a:t>
-            </a:r>
-          </a:p>
-          <a:p>
-            <a:r>
-              <a:rPr lang="en-US" dirty="0"/>
-              <a:t>What other zip codes have similar weather patterns? </a:t>
             </a:r>
           </a:p>
         </p:txBody>
@@ -7126,6 +7193,13 @@
   <p:clrMapOvr>
     <a:masterClrMapping/>
   </p:clrMapOvr>
+  <p:timing>
+    <p:tnLst>
+      <p:par>
+        <p:cTn xmlns:p14="http://schemas.microsoft.com/office/powerpoint/2010/main" id="1" dur="indefinite" restart="never" nodeType="tmRoot"/>
+      </p:par>
+    </p:tnLst>
+  </p:timing>
 </p:sld>
 </file>
 
@@ -7151,7 +7225,7 @@
           <p:cNvPr id="8" name="Picture 7">
             <a:extLst>
               <a:ext uri="{FF2B5EF4-FFF2-40B4-BE49-F238E27FC236}">
-                <a16:creationId xmlns:a16="http://schemas.microsoft.com/office/drawing/2014/main" id="{38A921BF-4AC0-441D-A122-045C15265740}"/>
+                <a16:creationId xmlns:a16="http://schemas.microsoft.com/office/drawing/2014/main" xmlns="" id="{38A921BF-4AC0-441D-A122-045C15265740}"/>
               </a:ext>
             </a:extLst>
           </p:cNvPr>
@@ -7186,6 +7260,13 @@
   <p:clrMapOvr>
     <a:masterClrMapping/>
   </p:clrMapOvr>
+  <p:timing>
+    <p:tnLst>
+      <p:par>
+        <p:cTn xmlns:p14="http://schemas.microsoft.com/office/powerpoint/2010/main" id="1" dur="indefinite" restart="never" nodeType="tmRoot"/>
+      </p:par>
+    </p:tnLst>
+  </p:timing>
 </p:sld>
 </file>
 
@@ -7244,6 +7325,13 @@
   <p:clrMapOvr>
     <a:masterClrMapping/>
   </p:clrMapOvr>
+  <p:timing>
+    <p:tnLst>
+      <p:par>
+        <p:cTn xmlns:p14="http://schemas.microsoft.com/office/powerpoint/2010/main" id="1" dur="indefinite" restart="never" nodeType="tmRoot"/>
+      </p:par>
+    </p:tnLst>
+  </p:timing>
 </p:sld>
 </file>
 
@@ -7304,6 +7392,13 @@
   <p:clrMapOvr>
     <a:masterClrMapping/>
   </p:clrMapOvr>
+  <p:timing>
+    <p:tnLst>
+      <p:par>
+        <p:cTn xmlns:p14="http://schemas.microsoft.com/office/powerpoint/2010/main" id="1" dur="indefinite" restart="never" nodeType="tmRoot"/>
+      </p:par>
+    </p:tnLst>
+  </p:timing>
 </p:sld>
 </file>
 
@@ -7536,6 +7631,13 @@
   <p:clrMapOvr>
     <a:masterClrMapping/>
   </p:clrMapOvr>
+  <p:timing>
+    <p:tnLst>
+      <p:par>
+        <p:cTn xmlns:p14="http://schemas.microsoft.com/office/powerpoint/2010/main" id="1" dur="indefinite" restart="never" nodeType="tmRoot"/>
+      </p:par>
+    </p:tnLst>
+  </p:timing>
 </p:sld>
 </file>
 
@@ -7596,6 +7698,13 @@
   <p:clrMapOvr>
     <a:masterClrMapping/>
   </p:clrMapOvr>
+  <p:timing>
+    <p:tnLst>
+      <p:par>
+        <p:cTn xmlns:p14="http://schemas.microsoft.com/office/powerpoint/2010/main" id="1" dur="indefinite" restart="never" nodeType="tmRoot"/>
+      </p:par>
+    </p:tnLst>
+  </p:timing>
 </p:sld>
 </file>
 
@@ -7656,6 +7765,13 @@
   <p:clrMapOvr>
     <a:masterClrMapping/>
   </p:clrMapOvr>
+  <p:timing>
+    <p:tnLst>
+      <p:par>
+        <p:cTn xmlns:p14="http://schemas.microsoft.com/office/powerpoint/2010/main" id="1" dur="indefinite" restart="never" nodeType="tmRoot"/>
+      </p:par>
+    </p:tnLst>
+  </p:timing>
 </p:sld>
 </file>
 
@@ -7794,6 +7910,13 @@
   <p:clrMapOvr>
     <a:masterClrMapping/>
   </p:clrMapOvr>
+  <p:timing>
+    <p:tnLst>
+      <p:par>
+        <p:cTn xmlns:p14="http://schemas.microsoft.com/office/powerpoint/2010/main" id="1" dur="indefinite" restart="never" nodeType="tmRoot"/>
+      </p:par>
+    </p:tnLst>
+  </p:timing>
 </p:sld>
 </file>
 
@@ -8094,7 +8217,7 @@
   <p:timing>
     <p:tnLst>
       <p:par>
-        <p:cTn id="1" dur="indefinite" restart="never" nodeType="tmRoot">
+        <p:cTn xmlns:p14="http://schemas.microsoft.com/office/powerpoint/2010/main" id="1" dur="indefinite" restart="never" nodeType="tmRoot">
           <p:childTnLst>
             <p:seq concurrent="1" nextAc="seek">
               <p:cTn id="2" dur="indefinite" nodeType="mainSeq">
@@ -8467,6 +8590,13 @@
   <p:clrMapOvr>
     <a:masterClrMapping/>
   </p:clrMapOvr>
+  <p:timing>
+    <p:tnLst>
+      <p:par>
+        <p:cTn xmlns:p14="http://schemas.microsoft.com/office/powerpoint/2010/main" id="1" dur="indefinite" restart="never" nodeType="tmRoot"/>
+      </p:par>
+    </p:tnLst>
+  </p:timing>
 </p:sld>
 </file>
 
@@ -8500,7 +8630,7 @@
         <p:spPr/>
         <p:txBody>
           <a:bodyPr>
-            <a:normAutofit fontScale="90000"/>
+            <a:normAutofit/>
           </a:bodyPr>
           <a:lstStyle/>
           <a:p>
@@ -8611,6 +8741,13 @@
   <p:clrMapOvr>
     <a:masterClrMapping/>
   </p:clrMapOvr>
+  <p:timing>
+    <p:tnLst>
+      <p:par>
+        <p:cTn xmlns:p14="http://schemas.microsoft.com/office/powerpoint/2010/main" id="1" dur="indefinite" restart="never" nodeType="tmRoot"/>
+      </p:par>
+    </p:tnLst>
+  </p:timing>
 </p:sld>
 </file>
 

</xml_diff>